<commit_message>
A few corrections and updates.
</commit_message>
<xml_diff>
--- a/presentations/2024-04 Webinars/FHIR-Terminology-Part-2-2024-04-24.pptx
+++ b/presentations/2024-04 Webinars/FHIR-Terminology-Part-2-2024-04-24.pptx
@@ -9763,7 +9763,7 @@
               <a:rPr lang="en-CA" dirty="0">
                 <a:hlinkClick r:id="rId5"/>
               </a:rPr>
-              <a:t>http://hapi.fhir.org/baseR4/Condition?severity:not=255604002</a:t>
+              <a:t>https://fhir.hausamconsulting.com/r4/Condition?severity:not=255604002</a:t>
             </a:r>
             <a:endParaRPr lang="en-CA" dirty="0"/>
           </a:p>
@@ -14064,7 +14064,7 @@
             <a:pPr lvl="1"/>
             <a:r>
               <a:rPr lang="en-US" dirty="0">
-                <a:hlinkClick r:id="" action="ppaction://noaction"/>
+                <a:hlinkClick r:id="rId4"/>
               </a:rPr>
               <a:t>https://fhir.hausamconsulting.com/r4/ValueSet/$validate-code?url=http://hl7.org/fhir/ValueSet/condition-category&amp;system=http://terminology.hl7.org/CodeSystem/condition-category&amp;code=problem-list-item</a:t>
             </a:r>

</xml_diff>

<commit_message>
Clean up the display and proper escaping of the query strings in hyperlinks.  Further minor updates.
</commit_message>
<xml_diff>
--- a/presentations/2024-04 Webinars/FHIR-Terminology-Part-2-2024-04-24.pptx
+++ b/presentations/2024-04 Webinars/FHIR-Terminology-Part-2-2024-04-24.pptx
@@ -9362,9 +9362,15 @@
               <a:rPr lang="en-CA" dirty="0">
                 <a:hlinkClick r:id="rId2"/>
               </a:rPr>
-              <a:t>https://fhir.hausamconsulting.com/r4/Condition?code=http%3A%2F%2Fsnomed.info%2Fsct|38341003</a:t>
-            </a:r>
-            <a:endParaRPr lang="en-CA" dirty="0"/>
+              <a:t>https://fhir.hausamconsulting.com/r4/Condition?</a:t>
+            </a:r>
+            <a:r>
+              <a:rPr lang="en-CA" i="1" dirty="0">
+                <a:hlinkClick r:id="rId2"/>
+              </a:rPr>
+              <a:t>code=http://snomed.info/sct|38341003</a:t>
+            </a:r>
+            <a:endParaRPr lang="en-CA" i="1" dirty="0"/>
           </a:p>
           <a:p>
             <a:pPr lvl="1"/>
@@ -9521,9 +9527,15 @@
               <a:rPr lang="en-CA" dirty="0">
                 <a:hlinkClick r:id="rId2"/>
               </a:rPr>
-              <a:t>http://hapi.fhir.org/baseR4/AllergyIntolerance?code=http%3A%2F%2Fsnomed.info%2Fsct|</a:t>
-            </a:r>
-            <a:endParaRPr lang="en-CA" dirty="0"/>
+              <a:t>http://hapi.fhir.org/baseR4/AllergyIntolerance?</a:t>
+            </a:r>
+            <a:r>
+              <a:rPr lang="en-CA" i="1" dirty="0">
+                <a:hlinkClick r:id="rId2"/>
+              </a:rPr>
+              <a:t>code=http://snomed.info/sct|</a:t>
+            </a:r>
+            <a:endParaRPr lang="en-CA" i="1" dirty="0"/>
           </a:p>
           <a:p>
             <a:pPr lvl="1"/>
@@ -9538,9 +9550,15 @@
               <a:rPr lang="en-GB" dirty="0">
                 <a:hlinkClick r:id="rId3"/>
               </a:rPr>
-              <a:t>https://fhir.hausamconsulting.com/r4/AllergyIntolerance?code=|allergy4387</a:t>
-            </a:r>
-            <a:endParaRPr lang="en-CA" dirty="0"/>
+              <a:t>https://fhir.hausamconsulting.com/r4/AllergyIntolerance?</a:t>
+            </a:r>
+            <a:r>
+              <a:rPr lang="en-GB" i="1" dirty="0">
+                <a:hlinkClick r:id="rId3"/>
+              </a:rPr>
+              <a:t>code=|allergy4387</a:t>
+            </a:r>
+            <a:endParaRPr lang="en-CA" i="1" dirty="0"/>
           </a:p>
           <a:p>
             <a:pPr lvl="2"/>
@@ -9716,9 +9734,15 @@
               <a:rPr lang="en-CA" dirty="0">
                 <a:hlinkClick r:id="rId2"/>
               </a:rPr>
-              <a:t>http://hapi.fhir.org/baseR4/Condition?code:text=angina</a:t>
-            </a:r>
-            <a:endParaRPr lang="en-CA" dirty="0"/>
+              <a:t>http://hapi.fhir.org/baseR4/Condition?</a:t>
+            </a:r>
+            <a:r>
+              <a:rPr lang="en-CA" i="1" dirty="0">
+                <a:hlinkClick r:id="rId2"/>
+              </a:rPr>
+              <a:t>code:text=angina</a:t>
+            </a:r>
+            <a:endParaRPr lang="en-CA" i="1" dirty="0"/>
           </a:p>
           <a:p>
             <a:pPr lvl="2"/>
@@ -9726,9 +9750,15 @@
               <a:rPr lang="en-CA" dirty="0">
                 <a:hlinkClick r:id="rId3"/>
               </a:rPr>
-              <a:t>http://hapi.fhir.org/baseR4/Condition?code:text=angin</a:t>
-            </a:r>
-            <a:endParaRPr lang="en-CA" dirty="0"/>
+              <a:t>http://hapi.fhir.org/baseR4/Condition?</a:t>
+            </a:r>
+            <a:r>
+              <a:rPr lang="en-CA" i="1" dirty="0">
+                <a:hlinkClick r:id="rId3"/>
+              </a:rPr>
+              <a:t>code:text=angin</a:t>
+            </a:r>
+            <a:endParaRPr lang="en-CA" i="1" dirty="0"/>
           </a:p>
           <a:p>
             <a:pPr lvl="2"/>
@@ -9736,9 +9766,15 @@
               <a:rPr lang="en-CA" dirty="0">
                 <a:hlinkClick r:id="rId4"/>
               </a:rPr>
-              <a:t>http://hapi.fhir.org/baseR4/AllergyIntolerance?code:text=ibuprofen</a:t>
-            </a:r>
-            <a:endParaRPr lang="en-CA" dirty="0"/>
+              <a:t>http://hapi.fhir.org/baseR4/AllergyIntolerance?</a:t>
+            </a:r>
+            <a:r>
+              <a:rPr lang="en-CA" i="1" dirty="0">
+                <a:hlinkClick r:id="rId4"/>
+              </a:rPr>
+              <a:t>code:text=ibuprofen</a:t>
+            </a:r>
+            <a:endParaRPr lang="en-CA" i="1" dirty="0"/>
           </a:p>
           <a:p>
             <a:pPr lvl="1"/>
@@ -9763,9 +9799,15 @@
               <a:rPr lang="en-CA" dirty="0">
                 <a:hlinkClick r:id="rId5"/>
               </a:rPr>
-              <a:t>https://fhir.hausamconsulting.com/r4/Condition?severity:not=255604002</a:t>
-            </a:r>
-            <a:endParaRPr lang="en-CA" dirty="0"/>
+              <a:t>https://fhir.hausamconsulting.com/r4/Condition?</a:t>
+            </a:r>
+            <a:r>
+              <a:rPr lang="en-CA" i="1" dirty="0">
+                <a:hlinkClick r:id="rId5"/>
+              </a:rPr>
+              <a:t>severity:not=255604002</a:t>
+            </a:r>
+            <a:endParaRPr lang="en-CA" i="1" dirty="0"/>
           </a:p>
           <a:p>
             <a:pPr lvl="3"/>
@@ -9847,7 +9889,7 @@
           <a:lstStyle/>
           <a:p>
             <a:r>
-              <a:rPr lang="en-CA"/>
+              <a:rPr lang="en-CA" dirty="0"/>
               <a:t>Search parameters</a:t>
             </a:r>
           </a:p>
@@ -9944,21 +9986,15 @@
               <a:rPr lang="en-CA" dirty="0">
                 <a:hlinkClick r:id="rId4"/>
               </a:rPr>
-              <a:t>https://fhir.hausamconsulting.com/r4/Condition?code:</a:t>
-            </a:r>
-            <a:r>
-              <a:rPr lang="en-CA" b="1" dirty="0">
+              <a:t>https://fhir.hausamconsulting.com/r4/Condition?</a:t>
+            </a:r>
+            <a:r>
+              <a:rPr lang="en-CA" i="1" dirty="0">
                 <a:hlinkClick r:id="rId4"/>
               </a:rPr>
-              <a:t>in</a:t>
-            </a:r>
-            <a:r>
-              <a:rPr lang="en-CA" dirty="0">
-                <a:hlinkClick r:id="rId4"/>
-              </a:rPr>
-              <a:t>=http%3A%2F%2Fexample.org%2Fvs%2Fupper-respiratory-infection</a:t>
-            </a:r>
-            <a:endParaRPr lang="en-CA" dirty="0">
+              <a:t>code:in=http://example.org/vs/upper-respiratory-infection</a:t>
+            </a:r>
+            <a:endParaRPr lang="en-CA" i="1" dirty="0">
               <a:ea typeface="+mn-ea"/>
               <a:cs typeface="+mn-cs"/>
               <a:hlinkClick r:id="rId5"/>
@@ -10095,9 +10131,15 @@
               <a:rPr lang="en-GB" dirty="0">
                 <a:hlinkClick r:id="rId2"/>
               </a:rPr>
-              <a:t>https://fhir.hausamconsulting.com/r4/Condition?code:not-in=http%3A%2F%2Fexample.org%2Fvs%2Fupper-respiratory-infection</a:t>
-            </a:r>
-            <a:endParaRPr lang="en-GB" dirty="0"/>
+              <a:t>https://fhir.hausamconsulting.com/r4/Condition?</a:t>
+            </a:r>
+            <a:r>
+              <a:rPr lang="en-GB" i="1" dirty="0">
+                <a:hlinkClick r:id="rId2"/>
+              </a:rPr>
+              <a:t>code:not-in=http://example.org/vs/upper-respiratory-infection</a:t>
+            </a:r>
+            <a:endParaRPr lang="en-GB" i="1" dirty="0"/>
           </a:p>
           <a:p>
             <a:pPr lvl="3"/>
@@ -10264,21 +10306,27 @@
               <a:rPr lang="en-CA" dirty="0">
                 <a:hlinkClick r:id="rId2"/>
               </a:rPr>
-              <a:t>https://fhir.hausamconsulting.com/r4/Condition?code:</a:t>
-            </a:r>
-            <a:r>
-              <a:rPr lang="en-CA" b="1" dirty="0">
+              <a:t>https://fhir.hausamconsulting.com/r4/Condition?</a:t>
+            </a:r>
+            <a:r>
+              <a:rPr lang="en-CA" i="1" dirty="0">
                 <a:hlinkClick r:id="rId2"/>
               </a:rPr>
+              <a:t>code:</a:t>
+            </a:r>
+            <a:r>
+              <a:rPr lang="en-CA" b="1" i="1" dirty="0">
+                <a:hlinkClick r:id="rId2"/>
+              </a:rPr>
               <a:t>below</a:t>
             </a:r>
             <a:r>
-              <a:rPr lang="en-CA" dirty="0">
+              <a:rPr lang="en-CA" i="1" dirty="0">
                 <a:hlinkClick r:id="rId2"/>
               </a:rPr>
               <a:t>=http://snomed.info/sct|73211009</a:t>
             </a:r>
-            <a:endParaRPr lang="en-CA" dirty="0">
+            <a:endParaRPr lang="en-CA" i="1" dirty="0">
               <a:ea typeface="+mn-ea"/>
               <a:cs typeface="+mn-cs"/>
             </a:endParaRPr>
@@ -10300,21 +10348,27 @@
               <a:rPr lang="en-CA" dirty="0">
                 <a:hlinkClick r:id="rId3"/>
               </a:rPr>
-              <a:t>https://fhir.hausamconsulting.com/r4/Condition?code:</a:t>
-            </a:r>
-            <a:r>
-              <a:rPr lang="en-CA" b="1" dirty="0">
+              <a:t>https://fhir.hausamconsulting.com/r4/Condition?</a:t>
+            </a:r>
+            <a:r>
+              <a:rPr lang="en-CA" i="1" dirty="0">
                 <a:hlinkClick r:id="rId3"/>
               </a:rPr>
+              <a:t>code:</a:t>
+            </a:r>
+            <a:r>
+              <a:rPr lang="en-CA" b="1" i="1" dirty="0">
+                <a:hlinkClick r:id="rId3"/>
+              </a:rPr>
               <a:t>above</a:t>
             </a:r>
             <a:r>
-              <a:rPr lang="en-CA" dirty="0">
+              <a:rPr lang="en-CA" i="1" dirty="0">
                 <a:hlinkClick r:id="rId3"/>
               </a:rPr>
               <a:t>=http://snomed.info/sct|1481000119100</a:t>
             </a:r>
-            <a:endParaRPr lang="is-IS" dirty="0"/>
+            <a:endParaRPr lang="is-IS" i="1" dirty="0"/>
           </a:p>
         </p:txBody>
       </p:sp>
@@ -10482,9 +10536,15 @@
               <a:rPr lang="en-CA" dirty="0">
                 <a:hlinkClick r:id="rId3"/>
               </a:rPr>
-              <a:t>https://fhir.hausamconsulting.com/r4/Condition?code:below=http://snomed.info/sct|73211009&amp;_count=5</a:t>
-            </a:r>
-            <a:endParaRPr lang="is-IS" dirty="0"/>
+              <a:t>https://fhir.hausamconsulting.com/r4/Condition?</a:t>
+            </a:r>
+            <a:r>
+              <a:rPr lang="en-CA" i="1" dirty="0">
+                <a:hlinkClick r:id="rId3"/>
+              </a:rPr>
+              <a:t>code:below=http://snomed.info/sct|73211009&amp;_count=5</a:t>
+            </a:r>
+            <a:endParaRPr lang="is-IS" i="1" dirty="0"/>
           </a:p>
           <a:p>
             <a:pPr lvl="2"/>
@@ -14044,9 +14104,15 @@
               <a:rPr lang="en-US" dirty="0">
                 <a:hlinkClick r:id="rId2"/>
               </a:rPr>
-              <a:t>https://fhir.hausamconsulting.com/r4/ValueSet?url=http://hl7.org/fhir/ValueSet/condition-category</a:t>
-            </a:r>
-            <a:endParaRPr lang="en-US" dirty="0"/>
+              <a:t>https://fhir.hausamconsulting.com/r4/ValueSet?</a:t>
+            </a:r>
+            <a:r>
+              <a:rPr lang="en-US" i="1" dirty="0">
+                <a:hlinkClick r:id="rId2"/>
+              </a:rPr>
+              <a:t>url=http://hl7.org/fhir/ValueSet/condition-category</a:t>
+            </a:r>
+            <a:endParaRPr lang="en-US" i="1" dirty="0"/>
           </a:p>
           <a:p>
             <a:pPr lvl="1"/>
@@ -14054,9 +14120,15 @@
               <a:rPr lang="en-US" dirty="0">
                 <a:hlinkClick r:id="rId3"/>
               </a:rPr>
-              <a:t>https://fhir.hausamconsulting.com/r4/ValueSet/$expand?url=http://hl7.org/fhir/ValueSet/condition-category</a:t>
-            </a:r>
-            <a:endParaRPr lang="en-US" dirty="0">
+              <a:t>https://fhir.hausamconsulting.com/r4/ValueSet/$expand?</a:t>
+            </a:r>
+            <a:r>
+              <a:rPr lang="en-US" i="1" dirty="0">
+                <a:hlinkClick r:id="rId3"/>
+              </a:rPr>
+              <a:t>url=http://hl7.org/fhir/ValueSet/condition-category</a:t>
+            </a:r>
+            <a:endParaRPr lang="en-US" i="1" dirty="0">
               <a:hlinkClick r:id="" action="ppaction://noaction"/>
             </a:endParaRPr>
           </a:p>
@@ -14066,9 +14138,15 @@
               <a:rPr lang="en-US" dirty="0">
                 <a:hlinkClick r:id="rId4"/>
               </a:rPr>
-              <a:t>https://fhir.hausamconsulting.com/r4/ValueSet/$validate-code?url=http://hl7.org/fhir/ValueSet/condition-category&amp;system=http://terminology.hl7.org/CodeSystem/condition-category&amp;code=problem-list-item</a:t>
-            </a:r>
-            <a:endParaRPr lang="en-US" dirty="0"/>
+              <a:t>https://fhir.hausamconsulting.com/r4/ValueSet/$validate-code?</a:t>
+            </a:r>
+            <a:r>
+              <a:rPr lang="en-US" i="1" dirty="0">
+                <a:hlinkClick r:id="rId4"/>
+              </a:rPr>
+              <a:t>url=http://hl7.org/fhir/ValueSet/condition-category&amp;system=http://terminology.hl7.org/CodeSystem/condition-category&amp;code=problem-list-item</a:t>
+            </a:r>
+            <a:endParaRPr lang="en-US" i="1" dirty="0"/>
           </a:p>
         </p:txBody>
       </p:sp>
@@ -14187,9 +14265,15 @@
               <a:rPr lang="en-US" dirty="0">
                 <a:hlinkClick r:id="rId2"/>
               </a:rPr>
-              <a:t>https://terminz.azurewebsites.net/fhir/CodeSystem/$validate-code?system=http://snomed.info/sct&amp;code=233604007&amp;_format=json&amp;_pretty=true</a:t>
-            </a:r>
-            <a:endParaRPr lang="en-US" dirty="0"/>
+              <a:t>https://terminz.azurewebsites.net/fhir/CodeSystem/$validate-code?</a:t>
+            </a:r>
+            <a:r>
+              <a:rPr lang="en-US" i="1" dirty="0">
+                <a:hlinkClick r:id="rId2"/>
+              </a:rPr>
+              <a:t>system=http://snomed.info/sct&amp;code=233604007&amp;_format=json&amp;_pretty=true</a:t>
+            </a:r>
+            <a:endParaRPr lang="en-US" i="1" dirty="0"/>
           </a:p>
         </p:txBody>
       </p:sp>
@@ -14473,9 +14557,15 @@
               <a:rPr lang="en-US" dirty="0">
                 <a:hlinkClick r:id="rId2"/>
               </a:rPr>
-              <a:t>https://fhir.hausamconsulting.com/r4/CodeSystem/$lookup?system=http://snomed.info/sct&amp;code=233604007</a:t>
-            </a:r>
-            <a:endParaRPr lang="en-US" dirty="0"/>
+              <a:t>https://fhir.hausamconsulting.com/r4/CodeSystem/$lookup?</a:t>
+            </a:r>
+            <a:r>
+              <a:rPr lang="en-US" i="1" dirty="0">
+                <a:hlinkClick r:id="rId2"/>
+              </a:rPr>
+              <a:t>system=http://snomed.info/sct&amp;code=233604007</a:t>
+            </a:r>
+            <a:endParaRPr lang="en-US" i="1" dirty="0"/>
           </a:p>
           <a:p>
             <a:pPr lvl="1"/>
@@ -14483,9 +14573,15 @@
               <a:rPr lang="en-US" dirty="0">
                 <a:hlinkClick r:id="rId3"/>
               </a:rPr>
-              <a:t>http://tx.fhir.org/r4/CodeSystem/$lookup?system=http://snomed.info/sct&amp;code=233604007</a:t>
-            </a:r>
-            <a:endParaRPr lang="en-US" dirty="0"/>
+              <a:t>http://tx.fhir.org/r4/CodeSystem/$lookup?</a:t>
+            </a:r>
+            <a:r>
+              <a:rPr lang="en-US" i="1" dirty="0">
+                <a:hlinkClick r:id="rId3"/>
+              </a:rPr>
+              <a:t>system=http://snomed.info/sct&amp;code=233604007</a:t>
+            </a:r>
+            <a:endParaRPr lang="en-US" i="1" dirty="0"/>
           </a:p>
           <a:p>
             <a:pPr lvl="1"/>
@@ -14493,9 +14589,15 @@
               <a:rPr lang="en-US" dirty="0">
                 <a:hlinkClick r:id="rId4"/>
               </a:rPr>
-              <a:t>https://terminz.azurewebsites.net/fhir/CodeSystem/$lookup?system=http://snomed.info/sct&amp;code=233604007&amp;_format=json&amp;_pretty=true</a:t>
-            </a:r>
-            <a:endParaRPr lang="en-US" dirty="0"/>
+              <a:t>https://terminz.azurewebsites.net/fhir/CodeSystem/$lookup?</a:t>
+            </a:r>
+            <a:r>
+              <a:rPr lang="en-US" i="1" dirty="0">
+                <a:hlinkClick r:id="rId4"/>
+              </a:rPr>
+              <a:t>system=http://snomed.info/sct&amp;code=233604007&amp;_format=json&amp;_pretty=true</a:t>
+            </a:r>
+            <a:endParaRPr lang="en-US" i="1" dirty="0"/>
           </a:p>
         </p:txBody>
       </p:sp>
@@ -14810,10 +14912,25 @@
                   </a:extLst>
                 </a:hlinkClick>
               </a:rPr>
-              <a:t>https://fhir.hausamconsulting.com/r4/CodeSystem/$subsumes?system=http://snomed.info/sct&amp;codeA=</a:t>
-            </a:r>
-            <a:r>
-              <a:rPr lang="en-GB" dirty="0">
+              <a:t>https://fhir.hausamconsulting.com/r4/CodeSystem/$subsumes?</a:t>
+            </a:r>
+            <a:r>
+              <a:rPr lang="en-GB" i="1" dirty="0">
+                <a:solidFill>
+                  <a:srgbClr val="800080"/>
+                </a:solidFill>
+                <a:hlinkClick r:id="rId2">
+                  <a:extLst>
+                    <a:ext uri="{A12FA001-AC4F-418D-AE19-62706E023703}">
+                      <ahyp:hlinkClr xmlns:ahyp="http://schemas.microsoft.com/office/drawing/2018/hyperlinkcolor" val="tx"/>
+                    </a:ext>
+                  </a:extLst>
+                </a:hlinkClick>
+              </a:rPr>
+              <a:t>system=http://snomed.info/sct&amp;codeA=</a:t>
+            </a:r>
+            <a:r>
+              <a:rPr lang="en-GB" i="1" dirty="0">
                 <a:solidFill>
                   <a:srgbClr val="00B050"/>
                 </a:solidFill>
@@ -14828,7 +14945,7 @@
               <a:t>3738000</a:t>
             </a:r>
             <a:r>
-              <a:rPr lang="en-GB" dirty="0">
+              <a:rPr lang="en-GB" i="1" dirty="0">
                 <a:solidFill>
                   <a:srgbClr val="800080"/>
                 </a:solidFill>
@@ -14843,7 +14960,7 @@
               <a:t>&amp;codeB=</a:t>
             </a:r>
             <a:r>
-              <a:rPr lang="en-GB" dirty="0">
+              <a:rPr lang="en-GB" i="1" dirty="0">
                 <a:solidFill>
                   <a:srgbClr val="C00000"/>
                 </a:solidFill>
@@ -14857,7 +14974,7 @@
               </a:rPr>
               <a:t>235856003</a:t>
             </a:r>
-            <a:endParaRPr lang="en-GB" dirty="0">
+            <a:endParaRPr lang="en-GB" i="1" dirty="0">
               <a:solidFill>
                 <a:srgbClr val="C00000"/>
               </a:solidFill>
@@ -14878,10 +14995,25 @@
                   </a:extLst>
                 </a:hlinkClick>
               </a:rPr>
-              <a:t>https://fhir.hausamconsulting.com/r4/CodeSystem/$subsumes?system=http://snomed.info/sct&amp;codeA=</a:t>
-            </a:r>
-            <a:r>
-              <a:rPr lang="en-GB" dirty="0">
+              <a:t>https://fhir.hausamconsulting.com/r4/CodeSystem/$subsumes?</a:t>
+            </a:r>
+            <a:r>
+              <a:rPr lang="en-GB" i="1" dirty="0">
+                <a:solidFill>
+                  <a:srgbClr val="0000FF"/>
+                </a:solidFill>
+                <a:hlinkClick r:id="rId3">
+                  <a:extLst>
+                    <a:ext uri="{A12FA001-AC4F-418D-AE19-62706E023703}">
+                      <ahyp:hlinkClr xmlns:ahyp="http://schemas.microsoft.com/office/drawing/2018/hyperlinkcolor" val="tx"/>
+                    </a:ext>
+                  </a:extLst>
+                </a:hlinkClick>
+              </a:rPr>
+              <a:t>system=http://snomed.info/sct&amp;codeA=</a:t>
+            </a:r>
+            <a:r>
+              <a:rPr lang="en-GB" i="1" dirty="0">
                 <a:solidFill>
                   <a:srgbClr val="C00000"/>
                 </a:solidFill>
@@ -14896,7 +15028,7 @@
               <a:t>235856003</a:t>
             </a:r>
             <a:r>
-              <a:rPr lang="en-GB" dirty="0">
+              <a:rPr lang="en-GB" i="1" dirty="0">
                 <a:solidFill>
                   <a:srgbClr val="0000FF"/>
                 </a:solidFill>
@@ -14911,7 +15043,7 @@
               <a:t>&amp;codeB=</a:t>
             </a:r>
             <a:r>
-              <a:rPr lang="en-GB" dirty="0">
+              <a:rPr lang="en-GB" i="1" dirty="0">
                 <a:solidFill>
                   <a:srgbClr val="00B050"/>
                 </a:solidFill>
@@ -14925,7 +15057,7 @@
               </a:rPr>
               <a:t>3738000</a:t>
             </a:r>
-            <a:endParaRPr lang="en-GB" dirty="0">
+            <a:endParaRPr lang="en-GB" i="1" dirty="0">
               <a:solidFill>
                 <a:srgbClr val="00B050"/>
               </a:solidFill>
@@ -14981,10 +15113,25 @@
                   </a:extLst>
                 </a:hlinkClick>
               </a:rPr>
-              <a:t>https://fhir.hausamconsulting.com/r4/CodeSystem/$subsumes?system=http://snomed.info/sct&amp;codeA=</a:t>
-            </a:r>
-            <a:r>
-              <a:rPr lang="en-GB" dirty="0">
+              <a:t>https://fhir.hausamconsulting.com/r4/CodeSystem/$subsumes?</a:t>
+            </a:r>
+            <a:r>
+              <a:rPr lang="en-GB" i="1" dirty="0">
+                <a:solidFill>
+                  <a:srgbClr val="0000FF"/>
+                </a:solidFill>
+                <a:hlinkClick r:id="rId4">
+                  <a:extLst>
+                    <a:ext uri="{A12FA001-AC4F-418D-AE19-62706E023703}">
+                      <ahyp:hlinkClr xmlns:ahyp="http://schemas.microsoft.com/office/drawing/2018/hyperlinkcolor" val="tx"/>
+                    </a:ext>
+                  </a:extLst>
+                </a:hlinkClick>
+              </a:rPr>
+              <a:t>system=http://snomed.info/sct&amp;codeA=</a:t>
+            </a:r>
+            <a:r>
+              <a:rPr lang="en-GB" i="1" dirty="0">
                 <a:solidFill>
                   <a:srgbClr val="FFC000"/>
                 </a:solidFill>
@@ -14999,7 +15146,7 @@
               <a:t>83072009</a:t>
             </a:r>
             <a:r>
-              <a:rPr lang="en-GB" dirty="0">
+              <a:rPr lang="en-GB" i="1" dirty="0">
                 <a:solidFill>
                   <a:srgbClr val="0000FF"/>
                 </a:solidFill>
@@ -15014,7 +15161,7 @@
               <a:t>&amp;codeB=</a:t>
             </a:r>
             <a:r>
-              <a:rPr lang="en-GB" dirty="0">
+              <a:rPr lang="en-GB" i="1" dirty="0">
                 <a:solidFill>
                   <a:srgbClr val="00B050"/>
                 </a:solidFill>
@@ -15028,7 +15175,7 @@
               </a:rPr>
               <a:t>3738000</a:t>
             </a:r>
-            <a:endParaRPr lang="en-GB" dirty="0">
+            <a:endParaRPr lang="en-GB" i="1" dirty="0">
               <a:solidFill>
                 <a:srgbClr val="00B050"/>
               </a:solidFill>
@@ -15210,57 +15357,21 @@
             <a:pPr lvl="1"/>
             <a:r>
               <a:rPr lang="en-US" dirty="0">
-                <a:hlinkClick r:id="" action="ppaction://noaction"/>
-              </a:rPr>
-              <a:t>https://terminz.azurewebsites.net/fhir</a:t>
-            </a:r>
-            <a:r>
-              <a:rPr lang="en-GB" dirty="0">
-                <a:solidFill>
-                  <a:srgbClr val="800080"/>
-                </a:solidFill>
                 <a:hlinkClick r:id="rId3"/>
               </a:rPr>
-              <a:t>/CodeSystem/$subsumes?system=http://snomed.info/sct&amp;codeA=</a:t>
-            </a:r>
-            <a:r>
-              <a:rPr lang="en-GB" dirty="0">
-                <a:solidFill>
-                  <a:srgbClr val="00B050"/>
-                </a:solidFill>
+              <a:t>https://terminz.azurewebsites.net/fhir/CodeSystem/$subsumes?</a:t>
+            </a:r>
+            <a:r>
+              <a:rPr lang="en-US" i="1" dirty="0">
                 <a:hlinkClick r:id="rId3"/>
               </a:rPr>
-              <a:t>3738000</a:t>
-            </a:r>
-            <a:r>
-              <a:rPr lang="en-GB" dirty="0">
-                <a:solidFill>
-                  <a:srgbClr val="800080"/>
-                </a:solidFill>
-                <a:hlinkClick r:id="rId3"/>
-              </a:rPr>
-              <a:t>&amp;codeB=</a:t>
-            </a:r>
-            <a:r>
-              <a:rPr lang="en-GB" dirty="0">
-                <a:solidFill>
-                  <a:srgbClr val="00B050"/>
-                </a:solidFill>
-                <a:hlinkClick r:id="rId3"/>
-              </a:rPr>
-              <a:t>3738000</a:t>
-            </a:r>
-            <a:r>
-              <a:rPr lang="en-US" dirty="0">
-                <a:hlinkClick r:id="rId3"/>
-              </a:rPr>
-              <a:t> &amp;_format=json&amp;_pretty=true</a:t>
-            </a:r>
-            <a:endParaRPr lang="en-GB" dirty="0">
+              <a:t>system=http://snomed.info/sct&amp;codeA=3738000&amp;codeB=3738000&amp;_format=json&amp;_pretty=true</a:t>
+            </a:r>
+            <a:endParaRPr lang="en-GB" i="1" dirty="0">
               <a:solidFill>
                 <a:srgbClr val="800080"/>
               </a:solidFill>
-              <a:hlinkClick r:id="rId2">
+              <a:hlinkClick r:id="rId4">
                 <a:extLst>
                   <a:ext uri="{A12FA001-AC4F-418D-AE19-62706E023703}">
                     <ahyp:hlinkClr xmlns:ahyp="http://schemas.microsoft.com/office/drawing/2018/hyperlinkcolor" val="tx"/>
@@ -15410,9 +15521,18 @@
                 </a:solidFill>
                 <a:hlinkClick r:id="rId2"/>
               </a:rPr>
-              <a:t>http://tx.fhir.org/r4/CodeSystem/$subsumes?system=http://snomed.info/sct&amp;codeA=3738000&amp;codeB=3738000</a:t>
-            </a:r>
-            <a:endParaRPr lang="en-US" dirty="0">
+              <a:t>http://tx.fhir.org/r4/CodeSystem/$subsumes?</a:t>
+            </a:r>
+            <a:r>
+              <a:rPr lang="en-GB" i="1" dirty="0">
+                <a:solidFill>
+                  <a:srgbClr val="800080"/>
+                </a:solidFill>
+                <a:hlinkClick r:id="rId2"/>
+              </a:rPr>
+              <a:t>system=http://snomed.info/sct&amp;codeA=3738000&amp;codeB=3738000</a:t>
+            </a:r>
+            <a:endParaRPr lang="en-US" i="1" dirty="0">
               <a:hlinkClick r:id="rId3"/>
             </a:endParaRPr>
           </a:p>
@@ -15422,9 +15542,15 @@
               <a:rPr lang="en-US" dirty="0">
                 <a:hlinkClick r:id="rId4"/>
               </a:rPr>
-              <a:t>https://r4.ontoserver.csiro.au/fhir/CodeSystem/$subsumes?system=http://snomed.info/sct&amp;codeA=3738000&amp;codeB=3738000</a:t>
-            </a:r>
-            <a:endParaRPr lang="en-US" dirty="0"/>
+              <a:t>https://r4.ontoserver.csiro.au/fhir/CodeSystem/$subsumes?</a:t>
+            </a:r>
+            <a:r>
+              <a:rPr lang="en-US" i="1" dirty="0">
+                <a:hlinkClick r:id="rId4"/>
+              </a:rPr>
+              <a:t>system=http://snomed.info/sct&amp;codeA=3738000&amp;codeB=3738000</a:t>
+            </a:r>
+            <a:endParaRPr lang="en-US" i="1" dirty="0"/>
           </a:p>
           <a:p>
             <a:pPr lvl="1"/>
@@ -15432,9 +15558,15 @@
               <a:rPr lang="en-US" dirty="0">
                 <a:hlinkClick r:id="rId5"/>
               </a:rPr>
-              <a:t>https://snowstorm.ihtsdotools.org/fhir/CodeSystem/$subsumes?system=http://snomed.info/sct&amp;codeA=3738000&amp;codeB=3738000&amp;_format=json&amp;_pretty=true</a:t>
-            </a:r>
-            <a:endParaRPr lang="en-GB" dirty="0">
+              <a:t>https://snowstorm.ihtsdotools.org/fhir/CodeSystem/$subsumes?</a:t>
+            </a:r>
+            <a:r>
+              <a:rPr lang="en-US" i="1" dirty="0">
+                <a:hlinkClick r:id="rId5"/>
+              </a:rPr>
+              <a:t>system=http://snomed.info/sct&amp;codeA=3738000&amp;codeB=3738000&amp;_format=json&amp;_pretty=true</a:t>
+            </a:r>
+            <a:endParaRPr lang="en-GB" i="1" dirty="0">
               <a:solidFill>
                 <a:srgbClr val="800080"/>
               </a:solidFill>
@@ -15777,9 +15909,15 @@
               <a:rPr lang="en-US" dirty="0">
                 <a:hlinkClick r:id="rId2"/>
               </a:rPr>
-              <a:t>https://terminz.azurewebsites.net/fhir/ConceptMap?source=http://hl7.org/fhir/ValueSet/address-use&amp;target=http://terminology.hl7.org/ValueSet/v3-AddressUse&amp;_format=json&amp;_pretty=true</a:t>
-            </a:r>
-            <a:endParaRPr lang="en-US" dirty="0"/>
+              <a:t>https://terminz.azurewebsites.net/fhir/ConceptMap?</a:t>
+            </a:r>
+            <a:r>
+              <a:rPr lang="en-US" i="1" dirty="0">
+                <a:hlinkClick r:id="rId2"/>
+              </a:rPr>
+              <a:t>source=http://hl7.org/fhir/ValueSet/address-use&amp;target=http://terminology.hl7.org/ValueSet/v3-AddressUse&amp;_format=json&amp;_pretty=true</a:t>
+            </a:r>
+            <a:endParaRPr lang="en-US" i="1" dirty="0"/>
           </a:p>
         </p:txBody>
       </p:sp>
@@ -16075,10 +16213,25 @@
                   </a:extLst>
                 </a:hlinkClick>
               </a:rPr>
-              <a:t>https://terminz.azurewebsites.net/fhir/ConceptMap/$translate?system=http://hl7.org/fhir/address-use&amp;code=</a:t>
-            </a:r>
-            <a:r>
-              <a:rPr lang="en-US" dirty="0">
+              <a:t>https://terminz.azurewebsites.net/fhir/ConceptMap/$translate?</a:t>
+            </a:r>
+            <a:r>
+              <a:rPr lang="en-US" i="1" dirty="0">
+                <a:solidFill>
+                  <a:srgbClr val="800080"/>
+                </a:solidFill>
+                <a:hlinkClick r:id="rId2">
+                  <a:extLst>
+                    <a:ext uri="{A12FA001-AC4F-418D-AE19-62706E023703}">
+                      <ahyp:hlinkClr xmlns:ahyp="http://schemas.microsoft.com/office/drawing/2018/hyperlinkcolor" val="tx"/>
+                    </a:ext>
+                  </a:extLst>
+                </a:hlinkClick>
+              </a:rPr>
+              <a:t>system=http://hl7.org/fhir/address-use&amp;code=</a:t>
+            </a:r>
+            <a:r>
+              <a:rPr lang="en-US" i="1" dirty="0">
                 <a:solidFill>
                   <a:srgbClr val="00B050"/>
                 </a:solidFill>
@@ -16093,7 +16246,7 @@
               <a:t>home</a:t>
             </a:r>
             <a:r>
-              <a:rPr lang="en-US" dirty="0">
+              <a:rPr lang="en-US" i="1" dirty="0">
                 <a:solidFill>
                   <a:srgbClr val="800080"/>
                 </a:solidFill>
@@ -16107,7 +16260,7 @@
               </a:rPr>
               <a:t>&amp;source=http://hl7.org/fhir/ValueSet/address-use&amp;target=http://terminology.hl7.org/ValueSet/v3-AddressUse&amp;_format=json&amp;_pretty=true</a:t>
             </a:r>
-            <a:endParaRPr lang="en-US" dirty="0"/>
+            <a:endParaRPr lang="en-US" i="1" dirty="0"/>
           </a:p>
         </p:txBody>
       </p:sp>
@@ -16249,10 +16402,25 @@
                   </a:extLst>
                 </a:hlinkClick>
               </a:rPr>
-              <a:t>https://terminz.azurewebsites.net/fhir/ConceptMap/$translate?system=http://hl7.org/fhir/address-use&amp;code=</a:t>
-            </a:r>
-            <a:r>
-              <a:rPr lang="en-US" dirty="0">
+              <a:t>https://terminz.azurewebsites.net/fhir/ConceptMap/$translate?</a:t>
+            </a:r>
+            <a:r>
+              <a:rPr lang="en-US" i="1" dirty="0">
+                <a:solidFill>
+                  <a:srgbClr val="0000FF"/>
+                </a:solidFill>
+                <a:hlinkClick r:id="rId2">
+                  <a:extLst>
+                    <a:ext uri="{A12FA001-AC4F-418D-AE19-62706E023703}">
+                      <ahyp:hlinkClr xmlns:ahyp="http://schemas.microsoft.com/office/drawing/2018/hyperlinkcolor" val="tx"/>
+                    </a:ext>
+                  </a:extLst>
+                </a:hlinkClick>
+              </a:rPr>
+              <a:t>system=http://hl7.org/fhir/address-use&amp;code=</a:t>
+            </a:r>
+            <a:r>
+              <a:rPr lang="en-US" i="1" dirty="0">
                 <a:solidFill>
                   <a:srgbClr val="00B050"/>
                 </a:solidFill>
@@ -16267,7 +16435,7 @@
               <a:t>old</a:t>
             </a:r>
             <a:r>
-              <a:rPr lang="en-US" dirty="0">
+              <a:rPr lang="en-US" i="1" dirty="0">
                 <a:solidFill>
                   <a:srgbClr val="0000FF"/>
                 </a:solidFill>
@@ -16281,7 +16449,7 @@
               </a:rPr>
               <a:t>&amp;source=http://hl7.org/fhir/ValueSet/address-use&amp;target=http://terminology.hl7.org/ValueSet/v3-AddressUse&amp;_format=json&amp;_pretty=true</a:t>
             </a:r>
-            <a:endParaRPr lang="en-US" dirty="0"/>
+            <a:endParaRPr lang="en-US" i="1" dirty="0"/>
           </a:p>
         </p:txBody>
       </p:sp>
@@ -18153,7 +18321,7 @@
             <a:pPr lvl="1"/>
             <a:r>
               <a:rPr lang="en-US" dirty="0"/>
-              <a:t>Can serve as the basis for the $expansion operation</a:t>
+              <a:t>Can serve as the basis for the $expand operation</a:t>
             </a:r>
           </a:p>
           <a:p>
@@ -18315,21 +18483,15 @@
               <a:rPr lang="en-US" dirty="0">
                 <a:hlinkClick r:id="rId2"/>
               </a:rPr>
-              <a:t>https://r4.ontoserver.csiro.au/fhir/ValueSet/$expand?url=http%3A%2F%2Fsnomed.info%2Fsct%3Ffhir_vs=isa%2F233604007&amp;_format=</a:t>
-            </a:r>
-            <a:r>
-              <a:rPr lang="en-US" dirty="0" err="1">
+              <a:t>https://r4.ontoserver.csiro.au/fhir/ValueSet/$expand?</a:t>
+            </a:r>
+            <a:r>
+              <a:rPr lang="en-US" i="1" dirty="0">
                 <a:hlinkClick r:id="rId2"/>
               </a:rPr>
-              <a:t>json</a:t>
-            </a:r>
-            <a:r>
-              <a:rPr lang="en-US" dirty="0">
-                <a:hlinkClick r:id="rId2"/>
-              </a:rPr>
-              <a:t>&amp;_pretty=true</a:t>
-            </a:r>
-            <a:endParaRPr lang="en-US" dirty="0"/>
+              <a:t>url=http://snomed.info/sct?fhir_vs=isa/233604007&amp;_format=json&amp;_pretty=true</a:t>
+            </a:r>
+            <a:endParaRPr lang="en-US" i="1" dirty="0"/>
           </a:p>
           <a:p>
             <a:pPr lvl="1"/>
@@ -18337,9 +18499,15 @@
               <a:rPr lang="en-US" dirty="0">
                 <a:hlinkClick r:id="rId3"/>
               </a:rPr>
-              <a:t>http://tx.fhir.org/r4/ValueSet/$expand?url=http%3A%2F%2Fsnomed.info%2Fsct%3Ffhir_vs=isa%2F233604007</a:t>
-            </a:r>
-            <a:endParaRPr lang="en-US" dirty="0"/>
+              <a:t>http://tx.fhir.org/r4/ValueSet/$expand?</a:t>
+            </a:r>
+            <a:r>
+              <a:rPr lang="en-US" i="1" dirty="0">
+                <a:hlinkClick r:id="rId3"/>
+              </a:rPr>
+              <a:t>url=http://snomed.info/sct?fhir_vs=isa/233604007</a:t>
+            </a:r>
+            <a:endParaRPr lang="en-US" i="1" dirty="0"/>
           </a:p>
           <a:p>
             <a:pPr lvl="1"/>
@@ -18347,9 +18515,15 @@
               <a:rPr lang="en-US" dirty="0">
                 <a:hlinkClick r:id="rId4"/>
               </a:rPr>
-              <a:t>https://terminz.azurewebsites.net/fhir/ValueSet/$expand?url=http%3A%2F%2Fsnomed.info%2Fsct%3Ffhir_vs=isa%2F233604007&amp;_format=json&amp;_pretty=true</a:t>
-            </a:r>
-            <a:endParaRPr lang="en-US" dirty="0"/>
+              <a:t>https://terminz.azurewebsites.net/fhir/ValueSet/$expand?</a:t>
+            </a:r>
+            <a:r>
+              <a:rPr lang="en-US" i="1" dirty="0">
+                <a:hlinkClick r:id="rId4"/>
+              </a:rPr>
+              <a:t>url=http://snomed.info/sct?fhir_vs=isa/233604007&amp;_format=json&amp;_pretty=true</a:t>
+            </a:r>
+            <a:endParaRPr lang="en-US" i="1" dirty="0"/>
           </a:p>
         </p:txBody>
       </p:sp>
@@ -18474,9 +18648,15 @@
               <a:rPr lang="en-US" dirty="0">
                 <a:hlinkClick r:id="rId2"/>
               </a:rPr>
-              <a:t>https://r4.ontoserver.csiro.au/fhir/ValueSet/$expand?url=http%3A%2F%2Fsnomed.info%2Fsct%2F900000000000207008%2Fversion%2F20220731%3Ffhir_vs%3Decl%2F%3C%20233604007%20%7CPneumonia%20%28disorder%29%7C&amp;_format=json&amp;_pretty=true</a:t>
-            </a:r>
-            <a:endParaRPr lang="en-US" dirty="0"/>
+              <a:t>https://r4.ontoserver.csiro.au/fhir/ValueSet/$expand?</a:t>
+            </a:r>
+            <a:r>
+              <a:rPr lang="en-US" i="1" dirty="0">
+                <a:hlinkClick r:id="rId2"/>
+              </a:rPr>
+              <a:t>url=http://snomed.info/sct/900000000000207008/version/20220731?fhir_vs=ecl/&lt; 233604007 |Pneumonia (disorder)|&amp;_format=json&amp;_pretty=true</a:t>
+            </a:r>
+            <a:endParaRPr lang="en-US" i="1" dirty="0"/>
           </a:p>
         </p:txBody>
       </p:sp>
@@ -21318,6 +21498,21 @@
             <a:r>
               <a:rPr lang="en-US" dirty="0"/>
               <a:t>Terminology use and considerations for FHIR IG publishing</a:t>
+            </a:r>
+          </a:p>
+          <a:p>
+            <a:pPr lvl="1"/>
+            <a:r>
+              <a:rPr lang="en-US" dirty="0"/>
+              <a:t>Use of alternate terminology servers (e.g., </a:t>
+            </a:r>
+            <a:r>
+              <a:rPr lang="en-US" dirty="0" err="1"/>
+              <a:t>Ontoserver</a:t>
+            </a:r>
+            <a:r>
+              <a:rPr lang="en-US" dirty="0"/>
+              <a:t>)</a:t>
             </a:r>
           </a:p>
           <a:p>

</xml_diff>

<commit_message>
Add note about url escaping.
</commit_message>
<xml_diff>
--- a/presentations/2024-04 Webinars/FHIR-Terminology-Part-2-2024-04-24.pptx
+++ b/presentations/2024-04 Webinars/FHIR-Terminology-Part-2-2024-04-24.pptx
@@ -9427,6 +9427,93 @@
               <a:t>11</a:t>
             </a:fld>
             <a:endParaRPr lang="en-CA"/>
+          </a:p>
+        </p:txBody>
+      </p:sp>
+      <p:sp>
+        <p:nvSpPr>
+          <p:cNvPr id="5" name="TextBox 4">
+            <a:extLst>
+              <a:ext uri="{FF2B5EF4-FFF2-40B4-BE49-F238E27FC236}">
+                <a16:creationId xmlns:a16="http://schemas.microsoft.com/office/drawing/2014/main" id="{98CBF9E3-1B9E-62DD-D12C-D247E4005A78}"/>
+              </a:ext>
+            </a:extLst>
+          </p:cNvPr>
+          <p:cNvSpPr txBox="1"/>
+          <p:nvPr/>
+        </p:nvSpPr>
+        <p:spPr>
+          <a:xfrm>
+            <a:off x="1052946" y="4228646"/>
+            <a:ext cx="6373090" cy="738664"/>
+          </a:xfrm>
+          <a:prstGeom prst="rect">
+            <a:avLst/>
+          </a:prstGeom>
+          <a:noFill/>
+        </p:spPr>
+        <p:txBody>
+          <a:bodyPr wrap="square" rtlCol="0">
+            <a:spAutoFit/>
+          </a:bodyPr>
+          <a:lstStyle/>
+          <a:p>
+            <a:r>
+              <a:rPr lang="en-US" sz="1400" dirty="0">
+                <a:solidFill>
+                  <a:srgbClr val="00B050"/>
+                </a:solidFill>
+              </a:rPr>
+              <a:t>Note: In this </a:t>
+            </a:r>
+            <a:r>
+              <a:rPr lang="en-US" sz="1400">
+                <a:solidFill>
+                  <a:srgbClr val="00B050"/>
+                </a:solidFill>
+              </a:rPr>
+              <a:t>and on following </a:t>
+            </a:r>
+            <a:r>
+              <a:rPr lang="en-US" sz="1400" dirty="0">
+                <a:solidFill>
+                  <a:srgbClr val="00B050"/>
+                </a:solidFill>
+              </a:rPr>
+              <a:t>pages, the </a:t>
+            </a:r>
+            <a:r>
+              <a:rPr lang="en-US" sz="1400" i="1" dirty="0">
+                <a:solidFill>
+                  <a:srgbClr val="00B050"/>
+                </a:solidFill>
+              </a:rPr>
+              <a:t>italicized</a:t>
+            </a:r>
+            <a:r>
+              <a:rPr lang="en-US" sz="1400" dirty="0">
+                <a:solidFill>
+                  <a:srgbClr val="00B050"/>
+                </a:solidFill>
+              </a:rPr>
+              <a:t> portion of a </a:t>
+            </a:r>
+            <a:r>
+              <a:rPr lang="en-US" sz="1400" dirty="0" err="1">
+                <a:solidFill>
+                  <a:srgbClr val="00B050"/>
+                </a:solidFill>
+              </a:rPr>
+              <a:t>url</a:t>
+            </a:r>
+            <a:r>
+              <a:rPr lang="en-US" sz="1400" dirty="0">
+                <a:solidFill>
+                  <a:srgbClr val="00B050"/>
+                </a:solidFill>
+              </a:rPr>
+              <a:t> means that the query string contains characters that are preferred or required to be properly HTML escaped.</a:t>
+            </a:r>
           </a:p>
         </p:txBody>
       </p:sp>

</xml_diff>